<commit_message>
Kubernetes Session notes updated
</commit_message>
<xml_diff>
--- a/kubernetes/session1/Kubernetes-Training-session-1.pptx
+++ b/kubernetes/session1/Kubernetes-Training-session-1.pptx
@@ -5,7 +5,7 @@
     <p:sldMasterId id="2147483648" r:id="rId1"/>
   </p:sldMasterIdLst>
   <p:notesMasterIdLst>
-    <p:notesMasterId r:id="rId14"/>
+    <p:notesMasterId r:id="rId13"/>
   </p:notesMasterIdLst>
   <p:sldIdLst>
     <p:sldId id="256" r:id="rId2"/>
@@ -16,10 +16,9 @@
     <p:sldId id="258" r:id="rId7"/>
     <p:sldId id="269" r:id="rId8"/>
     <p:sldId id="262" r:id="rId9"/>
-    <p:sldId id="264" r:id="rId10"/>
-    <p:sldId id="270" r:id="rId11"/>
-    <p:sldId id="265" r:id="rId12"/>
-    <p:sldId id="268" r:id="rId13"/>
+    <p:sldId id="270" r:id="rId10"/>
+    <p:sldId id="265" r:id="rId11"/>
+    <p:sldId id="268" r:id="rId12"/>
   </p:sldIdLst>
   <p:sldSz cx="12192000" cy="6858000"/>
   <p:notesSz cx="6858000" cy="9144000"/>
@@ -5607,7 +5606,7 @@
           <a:p>
             <a:fld id="{4E7409EE-020F-4DA2-B27B-1BB94B1729B0}" type="datetimeFigureOut">
               <a:rPr lang="en-IN" smtClean="0"/>
-              <a:t>21-12-2024</a:t>
+              <a:t>21-09-2025</a:t>
             </a:fld>
             <a:endParaRPr lang="en-IN"/>
           </a:p>
@@ -6067,90 +6066,6 @@
 </p:notes>
 </file>
 
-<file path=ppt/notesSlides/notesSlide3.xml><?xml version="1.0" encoding="utf-8"?>
-<p:notes xmlns:a="http://schemas.openxmlformats.org/drawingml/2006/main" xmlns:r="http://schemas.openxmlformats.org/officeDocument/2006/relationships" xmlns:p="http://schemas.openxmlformats.org/presentationml/2006/main">
-  <p:cSld>
-    <p:spTree>
-      <p:nvGrpSpPr>
-        <p:cNvPr id="1" name=""/>
-        <p:cNvGrpSpPr/>
-        <p:nvPr/>
-      </p:nvGrpSpPr>
-      <p:grpSpPr>
-        <a:xfrm>
-          <a:off x="0" y="0"/>
-          <a:ext cx="0" cy="0"/>
-          <a:chOff x="0" y="0"/>
-          <a:chExt cx="0" cy="0"/>
-        </a:xfrm>
-      </p:grpSpPr>
-      <p:sp>
-        <p:nvSpPr>
-          <p:cNvPr id="2" name="Slide Image Placeholder 1"/>
-          <p:cNvSpPr>
-            <a:spLocks noGrp="1" noRot="1" noChangeAspect="1"/>
-          </p:cNvSpPr>
-          <p:nvPr>
-            <p:ph type="sldImg"/>
-          </p:nvPr>
-        </p:nvSpPr>
-        <p:spPr/>
-      </p:sp>
-      <p:sp>
-        <p:nvSpPr>
-          <p:cNvPr id="3" name="Notes Placeholder 2"/>
-          <p:cNvSpPr>
-            <a:spLocks noGrp="1"/>
-          </p:cNvSpPr>
-          <p:nvPr>
-            <p:ph type="body" idx="1"/>
-          </p:nvPr>
-        </p:nvSpPr>
-        <p:spPr/>
-        <p:txBody>
-          <a:bodyPr/>
-          <a:lstStyle/>
-          <a:p>
-            <a:endParaRPr lang="en-IN" dirty="0"/>
-          </a:p>
-        </p:txBody>
-      </p:sp>
-      <p:sp>
-        <p:nvSpPr>
-          <p:cNvPr id="4" name="Slide Number Placeholder 3"/>
-          <p:cNvSpPr>
-            <a:spLocks noGrp="1"/>
-          </p:cNvSpPr>
-          <p:nvPr>
-            <p:ph type="sldNum" sz="quarter" idx="5"/>
-          </p:nvPr>
-        </p:nvSpPr>
-        <p:spPr/>
-        <p:txBody>
-          <a:bodyPr/>
-          <a:lstStyle/>
-          <a:p>
-            <a:fld id="{3AAF9B9B-0174-4758-85D0-2149510255F3}" type="slidenum">
-              <a:rPr lang="en-IN" smtClean="0"/>
-              <a:t>9</a:t>
-            </a:fld>
-            <a:endParaRPr lang="en-IN"/>
-          </a:p>
-        </p:txBody>
-      </p:sp>
-    </p:spTree>
-    <p:extLst>
-      <p:ext uri="{BB962C8B-B14F-4D97-AF65-F5344CB8AC3E}">
-        <p14:creationId xmlns:p14="http://schemas.microsoft.com/office/powerpoint/2010/main" val="3670855770"/>
-      </p:ext>
-    </p:extLst>
-  </p:cSld>
-  <p:clrMapOvr>
-    <a:masterClrMapping/>
-  </p:clrMapOvr>
-</p:notes>
-</file>
-
 <file path=ppt/slideLayouts/slideLayout1.xml><?xml version="1.0" encoding="utf-8"?>
 <p:sldLayout xmlns:a="http://schemas.openxmlformats.org/drawingml/2006/main" xmlns:r="http://schemas.openxmlformats.org/officeDocument/2006/relationships" xmlns:p="http://schemas.openxmlformats.org/presentationml/2006/main" type="title" preserve="1">
   <p:cSld name="Title Slide">
@@ -6300,7 +6215,7 @@
           <a:p>
             <a:fld id="{CBACD3C1-F4BD-4EFC-BCE4-7A53BF79F694}" type="datetimeFigureOut">
               <a:rPr lang="en-IN" smtClean="0"/>
-              <a:t>21-12-2024</a:t>
+              <a:t>21-09-2025</a:t>
             </a:fld>
             <a:endParaRPr lang="en-IN"/>
           </a:p>
@@ -6500,7 +6415,7 @@
           <a:p>
             <a:fld id="{CBACD3C1-F4BD-4EFC-BCE4-7A53BF79F694}" type="datetimeFigureOut">
               <a:rPr lang="en-IN" smtClean="0"/>
-              <a:t>21-12-2024</a:t>
+              <a:t>21-09-2025</a:t>
             </a:fld>
             <a:endParaRPr lang="en-IN"/>
           </a:p>
@@ -6710,7 +6625,7 @@
           <a:p>
             <a:fld id="{CBACD3C1-F4BD-4EFC-BCE4-7A53BF79F694}" type="datetimeFigureOut">
               <a:rPr lang="en-IN" smtClean="0"/>
-              <a:t>21-12-2024</a:t>
+              <a:t>21-09-2025</a:t>
             </a:fld>
             <a:endParaRPr lang="en-IN"/>
           </a:p>
@@ -6910,7 +6825,7 @@
           <a:p>
             <a:fld id="{CBACD3C1-F4BD-4EFC-BCE4-7A53BF79F694}" type="datetimeFigureOut">
               <a:rPr lang="en-IN" smtClean="0"/>
-              <a:t>21-12-2024</a:t>
+              <a:t>21-09-2025</a:t>
             </a:fld>
             <a:endParaRPr lang="en-IN"/>
           </a:p>
@@ -7186,7 +7101,7 @@
           <a:p>
             <a:fld id="{CBACD3C1-F4BD-4EFC-BCE4-7A53BF79F694}" type="datetimeFigureOut">
               <a:rPr lang="en-IN" smtClean="0"/>
-              <a:t>21-12-2024</a:t>
+              <a:t>21-09-2025</a:t>
             </a:fld>
             <a:endParaRPr lang="en-IN"/>
           </a:p>
@@ -7454,7 +7369,7 @@
           <a:p>
             <a:fld id="{CBACD3C1-F4BD-4EFC-BCE4-7A53BF79F694}" type="datetimeFigureOut">
               <a:rPr lang="en-IN" smtClean="0"/>
-              <a:t>21-12-2024</a:t>
+              <a:t>21-09-2025</a:t>
             </a:fld>
             <a:endParaRPr lang="en-IN"/>
           </a:p>
@@ -7869,7 +7784,7 @@
           <a:p>
             <a:fld id="{CBACD3C1-F4BD-4EFC-BCE4-7A53BF79F694}" type="datetimeFigureOut">
               <a:rPr lang="en-IN" smtClean="0"/>
-              <a:t>21-12-2024</a:t>
+              <a:t>21-09-2025</a:t>
             </a:fld>
             <a:endParaRPr lang="en-IN"/>
           </a:p>
@@ -8011,7 +7926,7 @@
           <a:p>
             <a:fld id="{CBACD3C1-F4BD-4EFC-BCE4-7A53BF79F694}" type="datetimeFigureOut">
               <a:rPr lang="en-IN" smtClean="0"/>
-              <a:t>21-12-2024</a:t>
+              <a:t>21-09-2025</a:t>
             </a:fld>
             <a:endParaRPr lang="en-IN"/>
           </a:p>
@@ -8124,7 +8039,7 @@
           <a:p>
             <a:fld id="{CBACD3C1-F4BD-4EFC-BCE4-7A53BF79F694}" type="datetimeFigureOut">
               <a:rPr lang="en-IN" smtClean="0"/>
-              <a:t>21-12-2024</a:t>
+              <a:t>21-09-2025</a:t>
             </a:fld>
             <a:endParaRPr lang="en-IN"/>
           </a:p>
@@ -8437,7 +8352,7 @@
           <a:p>
             <a:fld id="{CBACD3C1-F4BD-4EFC-BCE4-7A53BF79F694}" type="datetimeFigureOut">
               <a:rPr lang="en-IN" smtClean="0"/>
-              <a:t>21-12-2024</a:t>
+              <a:t>21-09-2025</a:t>
             </a:fld>
             <a:endParaRPr lang="en-IN"/>
           </a:p>
@@ -8726,7 +8641,7 @@
           <a:p>
             <a:fld id="{CBACD3C1-F4BD-4EFC-BCE4-7A53BF79F694}" type="datetimeFigureOut">
               <a:rPr lang="en-IN" smtClean="0"/>
-              <a:t>21-12-2024</a:t>
+              <a:t>21-09-2025</a:t>
             </a:fld>
             <a:endParaRPr lang="en-IN"/>
           </a:p>
@@ -8969,7 +8884,7 @@
           <a:p>
             <a:fld id="{CBACD3C1-F4BD-4EFC-BCE4-7A53BF79F694}" type="datetimeFigureOut">
               <a:rPr lang="en-IN" smtClean="0"/>
-              <a:t>21-12-2024</a:t>
+              <a:t>21-09-2025</a:t>
             </a:fld>
             <a:endParaRPr lang="en-IN"/>
           </a:p>
@@ -9996,593 +9911,6 @@
       </p:grpSpPr>
       <p:sp useBgFill="1">
         <p:nvSpPr>
-          <p:cNvPr id="34" name="Rectangle 33">
-            <a:extLst>
-              <a:ext uri="{FF2B5EF4-FFF2-40B4-BE49-F238E27FC236}">
-                <a16:creationId xmlns:a16="http://schemas.microsoft.com/office/drawing/2014/main" id="{1B15ED52-F352-441B-82BF-E0EA34836D08}"/>
-              </a:ext>
-              <a:ext uri="{C183D7F6-B498-43B3-948B-1728B52AA6E4}">
-                <adec:decorative xmlns:adec="http://schemas.microsoft.com/office/drawing/2017/decorative" val="1"/>
-              </a:ext>
-            </a:extLst>
-          </p:cNvPr>
-          <p:cNvSpPr>
-            <a:spLocks noGrp="1" noRot="1" noChangeAspect="1" noMove="1" noResize="1" noEditPoints="1" noAdjustHandles="1" noChangeArrowheads="1" noChangeShapeType="1" noTextEdit="1"/>
-          </p:cNvSpPr>
-          <p:nvPr>
-            <p:extLst>
-              <p:ext uri="{386F3935-93C4-4BCD-93E2-E3B085C9AB24}">
-                <p16:designElem xmlns:p16="http://schemas.microsoft.com/office/powerpoint/2015/main" val="1"/>
-              </p:ext>
-            </p:extLst>
-          </p:nvPr>
-        </p:nvSpPr>
-        <p:spPr>
-          <a:xfrm>
-            <a:off x="0" y="0"/>
-            <a:ext cx="12192000" cy="6858000"/>
-          </a:xfrm>
-          <a:prstGeom prst="rect">
-            <a:avLst/>
-          </a:prstGeom>
-          <a:ln w="12700" cap="flat" cmpd="sng" algn="ctr">
-            <a:noFill/>
-            <a:prstDash val="solid"/>
-            <a:miter lim="800000"/>
-          </a:ln>
-          <a:effectLst/>
-          <a:extLst>
-            <a:ext uri="{91240B29-F687-4F45-9708-019B960494DF}">
-              <a14:hiddenLine xmlns:a14="http://schemas.microsoft.com/office/drawing/2010/main" w="12700" cap="flat" cmpd="sng" algn="ctr">
-                <a:solidFill>
-                  <a:schemeClr val="accent1">
-                    <a:shade val="50000"/>
-                  </a:schemeClr>
-                </a:solidFill>
-                <a:prstDash val="solid"/>
-                <a:miter lim="800000"/>
-              </a14:hiddenLine>
-            </a:ext>
-          </a:extLst>
-        </p:spPr>
-        <p:style>
-          <a:lnRef idx="2">
-            <a:schemeClr val="accent1">
-              <a:shade val="50000"/>
-            </a:schemeClr>
-          </a:lnRef>
-          <a:fillRef idx="1">
-            <a:schemeClr val="accent1"/>
-          </a:fillRef>
-          <a:effectRef idx="0">
-            <a:schemeClr val="accent1"/>
-          </a:effectRef>
-          <a:fontRef idx="minor">
-            <a:schemeClr val="lt1"/>
-          </a:fontRef>
-        </p:style>
-        <p:txBody>
-          <a:bodyPr rtlCol="0" anchor="ctr"/>
-          <a:lstStyle/>
-          <a:p>
-            <a:pPr algn="ctr"/>
-            <a:endParaRPr lang="en-US"/>
-          </a:p>
-        </p:txBody>
-      </p:sp>
-      <p:sp>
-        <p:nvSpPr>
-          <p:cNvPr id="36" name="Rectangle 35">
-            <a:extLst>
-              <a:ext uri="{FF2B5EF4-FFF2-40B4-BE49-F238E27FC236}">
-                <a16:creationId xmlns:a16="http://schemas.microsoft.com/office/drawing/2014/main" id="{3B2E3793-BFE6-45A2-9B7B-E18844431C99}"/>
-              </a:ext>
-              <a:ext uri="{C183D7F6-B498-43B3-948B-1728B52AA6E4}">
-                <adec:decorative xmlns:adec="http://schemas.microsoft.com/office/drawing/2017/decorative" val="1"/>
-              </a:ext>
-            </a:extLst>
-          </p:cNvPr>
-          <p:cNvSpPr>
-            <a:spLocks noGrp="1" noRot="1" noChangeAspect="1" noMove="1" noResize="1" noEditPoints="1" noAdjustHandles="1" noChangeArrowheads="1" noChangeShapeType="1" noTextEdit="1"/>
-          </p:cNvSpPr>
-          <p:nvPr>
-            <p:extLst>
-              <p:ext uri="{386F3935-93C4-4BCD-93E2-E3B085C9AB24}">
-                <p16:designElem xmlns:p16="http://schemas.microsoft.com/office/powerpoint/2015/main" val="1"/>
-              </p:ext>
-            </p:extLst>
-          </p:nvPr>
-        </p:nvSpPr>
-        <p:spPr>
-          <a:xfrm flipH="1">
-            <a:off x="-1" y="-1"/>
-            <a:ext cx="12191998" cy="1590742"/>
-          </a:xfrm>
-          <a:prstGeom prst="rect">
-            <a:avLst/>
-          </a:prstGeom>
-          <a:gradFill>
-            <a:gsLst>
-              <a:gs pos="0">
-                <a:srgbClr val="000000"/>
-              </a:gs>
-              <a:gs pos="100000">
-                <a:schemeClr val="accent1">
-                  <a:lumMod val="75000"/>
-                </a:schemeClr>
-              </a:gs>
-            </a:gsLst>
-            <a:lin ang="8400000" scaled="0"/>
-          </a:gradFill>
-          <a:ln>
-            <a:noFill/>
-          </a:ln>
-        </p:spPr>
-        <p:style>
-          <a:lnRef idx="2">
-            <a:schemeClr val="accent1">
-              <a:shade val="50000"/>
-            </a:schemeClr>
-          </a:lnRef>
-          <a:fillRef idx="1">
-            <a:schemeClr val="accent1"/>
-          </a:fillRef>
-          <a:effectRef idx="0">
-            <a:schemeClr val="accent1"/>
-          </a:effectRef>
-          <a:fontRef idx="minor">
-            <a:schemeClr val="lt1"/>
-          </a:fontRef>
-        </p:style>
-        <p:txBody>
-          <a:bodyPr rtlCol="0" anchor="ctr"/>
-          <a:lstStyle/>
-          <a:p>
-            <a:pPr algn="ctr"/>
-            <a:endParaRPr lang="en-US"/>
-          </a:p>
-        </p:txBody>
-      </p:sp>
-      <p:sp>
-        <p:nvSpPr>
-          <p:cNvPr id="38" name="Rectangle 37">
-            <a:extLst>
-              <a:ext uri="{FF2B5EF4-FFF2-40B4-BE49-F238E27FC236}">
-                <a16:creationId xmlns:a16="http://schemas.microsoft.com/office/drawing/2014/main" id="{BC4C4868-CB8F-4AF9-9CDB-8108F2C19B67}"/>
-              </a:ext>
-              <a:ext uri="{C183D7F6-B498-43B3-948B-1728B52AA6E4}">
-                <adec:decorative xmlns:adec="http://schemas.microsoft.com/office/drawing/2017/decorative" val="1"/>
-              </a:ext>
-            </a:extLst>
-          </p:cNvPr>
-          <p:cNvSpPr>
-            <a:spLocks noGrp="1" noRot="1" noChangeAspect="1" noMove="1" noResize="1" noEditPoints="1" noAdjustHandles="1" noChangeArrowheads="1" noChangeShapeType="1" noTextEdit="1"/>
-          </p:cNvSpPr>
-          <p:nvPr>
-            <p:extLst>
-              <p:ext uri="{386F3935-93C4-4BCD-93E2-E3B085C9AB24}">
-                <p16:designElem xmlns:p16="http://schemas.microsoft.com/office/powerpoint/2015/main" val="1"/>
-              </p:ext>
-            </p:extLst>
-          </p:nvPr>
-        </p:nvSpPr>
-        <p:spPr>
-          <a:xfrm rot="10800000" flipH="1">
-            <a:off x="-3" y="0"/>
-            <a:ext cx="8115306" cy="1590742"/>
-          </a:xfrm>
-          <a:prstGeom prst="rect">
-            <a:avLst/>
-          </a:prstGeom>
-          <a:gradFill>
-            <a:gsLst>
-              <a:gs pos="20000">
-                <a:schemeClr val="accent1">
-                  <a:alpha val="0"/>
-                </a:schemeClr>
-              </a:gs>
-              <a:gs pos="100000">
-                <a:schemeClr val="accent1">
-                  <a:lumMod val="50000"/>
-                  <a:alpha val="55000"/>
-                </a:schemeClr>
-              </a:gs>
-            </a:gsLst>
-            <a:lin ang="13800000" scaled="0"/>
-          </a:gradFill>
-          <a:ln>
-            <a:noFill/>
-          </a:ln>
-        </p:spPr>
-        <p:style>
-          <a:lnRef idx="2">
-            <a:schemeClr val="accent1">
-              <a:shade val="50000"/>
-            </a:schemeClr>
-          </a:lnRef>
-          <a:fillRef idx="1">
-            <a:schemeClr val="accent1"/>
-          </a:fillRef>
-          <a:effectRef idx="0">
-            <a:schemeClr val="accent1"/>
-          </a:effectRef>
-          <a:fontRef idx="minor">
-            <a:schemeClr val="lt1"/>
-          </a:fontRef>
-        </p:style>
-        <p:txBody>
-          <a:bodyPr rtlCol="0" anchor="ctr"/>
-          <a:lstStyle/>
-          <a:p>
-            <a:pPr algn="ctr"/>
-            <a:endParaRPr lang="en-US"/>
-          </a:p>
-        </p:txBody>
-      </p:sp>
-      <p:sp>
-        <p:nvSpPr>
-          <p:cNvPr id="40" name="Rectangle 39">
-            <a:extLst>
-              <a:ext uri="{FF2B5EF4-FFF2-40B4-BE49-F238E27FC236}">
-                <a16:creationId xmlns:a16="http://schemas.microsoft.com/office/drawing/2014/main" id="{375E0459-6403-40CD-989D-56A4407CA12E}"/>
-              </a:ext>
-              <a:ext uri="{C183D7F6-B498-43B3-948B-1728B52AA6E4}">
-                <adec:decorative xmlns:adec="http://schemas.microsoft.com/office/drawing/2017/decorative" val="1"/>
-              </a:ext>
-            </a:extLst>
-          </p:cNvPr>
-          <p:cNvSpPr>
-            <a:spLocks noGrp="1" noRot="1" noChangeAspect="1" noMove="1" noResize="1" noEditPoints="1" noAdjustHandles="1" noChangeArrowheads="1" noChangeShapeType="1" noTextEdit="1"/>
-          </p:cNvSpPr>
-          <p:nvPr>
-            <p:extLst>
-              <p:ext uri="{386F3935-93C4-4BCD-93E2-E3B085C9AB24}">
-                <p16:designElem xmlns:p16="http://schemas.microsoft.com/office/powerpoint/2015/main" val="1"/>
-              </p:ext>
-            </p:extLst>
-          </p:nvPr>
-        </p:nvSpPr>
-        <p:spPr>
-          <a:xfrm flipH="1">
-            <a:off x="8115299" y="-1"/>
-            <a:ext cx="4076698" cy="1590742"/>
-          </a:xfrm>
-          <a:prstGeom prst="rect">
-            <a:avLst/>
-          </a:prstGeom>
-          <a:gradFill>
-            <a:gsLst>
-              <a:gs pos="0">
-                <a:schemeClr val="accent1">
-                  <a:alpha val="66000"/>
-                </a:schemeClr>
-              </a:gs>
-              <a:gs pos="100000">
-                <a:srgbClr val="000000">
-                  <a:alpha val="30000"/>
-                </a:srgbClr>
-              </a:gs>
-            </a:gsLst>
-            <a:lin ang="13200000" scaled="0"/>
-          </a:gradFill>
-          <a:ln>
-            <a:noFill/>
-          </a:ln>
-        </p:spPr>
-        <p:style>
-          <a:lnRef idx="2">
-            <a:schemeClr val="accent1">
-              <a:shade val="50000"/>
-            </a:schemeClr>
-          </a:lnRef>
-          <a:fillRef idx="1">
-            <a:schemeClr val="accent1"/>
-          </a:fillRef>
-          <a:effectRef idx="0">
-            <a:schemeClr val="accent1"/>
-          </a:effectRef>
-          <a:fontRef idx="minor">
-            <a:schemeClr val="lt1"/>
-          </a:fontRef>
-        </p:style>
-        <p:txBody>
-          <a:bodyPr rtlCol="0" anchor="ctr"/>
-          <a:lstStyle/>
-          <a:p>
-            <a:pPr algn="ctr"/>
-            <a:endParaRPr lang="en-US"/>
-          </a:p>
-        </p:txBody>
-      </p:sp>
-      <p:sp>
-        <p:nvSpPr>
-          <p:cNvPr id="42" name="Rectangle 41">
-            <a:extLst>
-              <a:ext uri="{FF2B5EF4-FFF2-40B4-BE49-F238E27FC236}">
-                <a16:creationId xmlns:a16="http://schemas.microsoft.com/office/drawing/2014/main" id="{53E5B1A8-3AC9-4BD1-9BBC-78CA94F2D1BA}"/>
-              </a:ext>
-              <a:ext uri="{C183D7F6-B498-43B3-948B-1728B52AA6E4}">
-                <adec:decorative xmlns:adec="http://schemas.microsoft.com/office/drawing/2017/decorative" val="1"/>
-              </a:ext>
-            </a:extLst>
-          </p:cNvPr>
-          <p:cNvSpPr>
-            <a:spLocks noGrp="1" noRot="1" noChangeAspect="1" noMove="1" noResize="1" noEditPoints="1" noAdjustHandles="1" noChangeArrowheads="1" noChangeShapeType="1" noTextEdit="1"/>
-          </p:cNvSpPr>
-          <p:nvPr>
-            <p:extLst>
-              <p:ext uri="{386F3935-93C4-4BCD-93E2-E3B085C9AB24}">
-                <p16:designElem xmlns:p16="http://schemas.microsoft.com/office/powerpoint/2015/main" val="1"/>
-              </p:ext>
-            </p:extLst>
-          </p:nvPr>
-        </p:nvSpPr>
-        <p:spPr>
-          <a:xfrm>
-            <a:off x="459350" y="-1"/>
-            <a:ext cx="11732646" cy="1597433"/>
-          </a:xfrm>
-          <a:prstGeom prst="rect">
-            <a:avLst/>
-          </a:prstGeom>
-          <a:gradFill>
-            <a:gsLst>
-              <a:gs pos="50000">
-                <a:srgbClr val="000000">
-                  <a:alpha val="0"/>
-                </a:srgbClr>
-              </a:gs>
-              <a:gs pos="99000">
-                <a:schemeClr val="accent1">
-                  <a:lumMod val="50000"/>
-                  <a:alpha val="52000"/>
-                </a:schemeClr>
-              </a:gs>
-            </a:gsLst>
-            <a:lin ang="16800000" scaled="0"/>
-          </a:gradFill>
-          <a:ln>
-            <a:noFill/>
-          </a:ln>
-        </p:spPr>
-        <p:style>
-          <a:lnRef idx="2">
-            <a:schemeClr val="accent1">
-              <a:shade val="50000"/>
-            </a:schemeClr>
-          </a:lnRef>
-          <a:fillRef idx="1">
-            <a:schemeClr val="accent1"/>
-          </a:fillRef>
-          <a:effectRef idx="0">
-            <a:schemeClr val="accent1"/>
-          </a:effectRef>
-          <a:fontRef idx="minor">
-            <a:schemeClr val="lt1"/>
-          </a:fontRef>
-        </p:style>
-        <p:txBody>
-          <a:bodyPr rtlCol="0" anchor="ctr"/>
-          <a:lstStyle/>
-          <a:p>
-            <a:pPr algn="ctr"/>
-            <a:endParaRPr lang="en-US"/>
-          </a:p>
-        </p:txBody>
-      </p:sp>
-      <p:sp>
-        <p:nvSpPr>
-          <p:cNvPr id="5" name="Title 4">
-            <a:extLst>
-              <a:ext uri="{FF2B5EF4-FFF2-40B4-BE49-F238E27FC236}">
-                <a16:creationId xmlns:a16="http://schemas.microsoft.com/office/drawing/2014/main" id="{FF0ABB06-8FF9-3914-C6A7-66FEE2BE00AB}"/>
-              </a:ext>
-            </a:extLst>
-          </p:cNvPr>
-          <p:cNvSpPr>
-            <a:spLocks noGrp="1"/>
-          </p:cNvSpPr>
-          <p:nvPr>
-            <p:ph type="title"/>
-          </p:nvPr>
-        </p:nvSpPr>
-        <p:spPr>
-          <a:xfrm>
-            <a:off x="1371599" y="294538"/>
-            <a:ext cx="9895951" cy="1033669"/>
-          </a:xfrm>
-        </p:spPr>
-        <p:txBody>
-          <a:bodyPr>
-            <a:normAutofit/>
-          </a:bodyPr>
-          <a:lstStyle/>
-          <a:p>
-            <a:r>
-              <a:rPr lang="en-US" sz="4000" dirty="0">
-                <a:solidFill>
-                  <a:srgbClr val="FFFFFF"/>
-                </a:solidFill>
-              </a:rPr>
-              <a:t>Kubernetes Objects</a:t>
-            </a:r>
-          </a:p>
-        </p:txBody>
-      </p:sp>
-      <p:sp>
-        <p:nvSpPr>
-          <p:cNvPr id="4" name="Content Placeholder 3">
-            <a:extLst>
-              <a:ext uri="{FF2B5EF4-FFF2-40B4-BE49-F238E27FC236}">
-                <a16:creationId xmlns:a16="http://schemas.microsoft.com/office/drawing/2014/main" id="{BAECFD7C-983F-AF14-825A-F9A9A2355071}"/>
-              </a:ext>
-            </a:extLst>
-          </p:cNvPr>
-          <p:cNvSpPr>
-            <a:spLocks noGrp="1"/>
-          </p:cNvSpPr>
-          <p:nvPr>
-            <p:ph idx="1"/>
-          </p:nvPr>
-        </p:nvSpPr>
-        <p:spPr>
-          <a:xfrm>
-            <a:off x="459350" y="1825624"/>
-            <a:ext cx="11224650" cy="4625975"/>
-          </a:xfrm>
-        </p:spPr>
-        <p:txBody>
-          <a:bodyPr>
-            <a:normAutofit/>
-          </a:bodyPr>
-          <a:lstStyle/>
-          <a:p>
-            <a:r>
-              <a:rPr lang="en-US" sz="1500" b="1" dirty="0"/>
-              <a:t>Pod</a:t>
-            </a:r>
-            <a:r>
-              <a:rPr lang="en-US" sz="1500" dirty="0"/>
-              <a:t>: The smallest and most basic unit in Kubernetes. It represents a single instance of a running process or workload. It can consist of one or more containers tightly coupled and sharing resources.</a:t>
-            </a:r>
-          </a:p>
-          <a:p>
-            <a:r>
-              <a:rPr lang="en-US" sz="1500" b="1" dirty="0" err="1"/>
-              <a:t>ReplicaSet</a:t>
-            </a:r>
-            <a:r>
-              <a:rPr lang="en-US" sz="1500" dirty="0"/>
-              <a:t>: Ensures a specified number of pod replicas are always running. Part of the scaling and self-healing mechanism in Kubernetes. Can be used directly, but Deployments are recommended for higher-level management.</a:t>
-            </a:r>
-          </a:p>
-          <a:p>
-            <a:r>
-              <a:rPr lang="en-US" sz="1500" b="1" dirty="0"/>
-              <a:t>Deployment</a:t>
-            </a:r>
-            <a:r>
-              <a:rPr lang="en-US" sz="1500" dirty="0"/>
-              <a:t>: Declarative approach to manage and update application deployments. It defines desired state, including the number of replicas and container images. Handles rolling updates and rollbacks to ensure high availability.</a:t>
-            </a:r>
-          </a:p>
-          <a:p>
-            <a:r>
-              <a:rPr lang="en-US" sz="1500" b="1" dirty="0"/>
-              <a:t>Service</a:t>
-            </a:r>
-            <a:r>
-              <a:rPr lang="en-US" sz="1500" dirty="0"/>
-              <a:t>: Enables networking and service discovery within the cluster. Provides a stable endpoint and load balancing for accessing a set of pods. Supports different types, including </a:t>
-            </a:r>
-            <a:r>
-              <a:rPr lang="en-US" sz="1500" dirty="0" err="1"/>
-              <a:t>ClusterIP</a:t>
-            </a:r>
-            <a:r>
-              <a:rPr lang="en-US" sz="1500" dirty="0"/>
-              <a:t>, </a:t>
-            </a:r>
-            <a:r>
-              <a:rPr lang="en-US" sz="1500" dirty="0" err="1"/>
-              <a:t>NodePort</a:t>
-            </a:r>
-            <a:r>
-              <a:rPr lang="en-US" sz="1500" dirty="0"/>
-              <a:t>, and LoadBalancer.</a:t>
-            </a:r>
-          </a:p>
-          <a:p>
-            <a:r>
-              <a:rPr lang="en-US" sz="1500" b="1" dirty="0" err="1"/>
-              <a:t>ConfigMap</a:t>
-            </a:r>
-            <a:r>
-              <a:rPr lang="en-US" sz="1500" dirty="0"/>
-              <a:t>: Stores configuration data as key-value pairs or files. Allows decoupling of configuration from the container images. Can be mounted as a volume or passed as environment variables to pods.</a:t>
-            </a:r>
-          </a:p>
-          <a:p>
-            <a:r>
-              <a:rPr lang="en-US" sz="1500" b="1" dirty="0"/>
-              <a:t>Secret</a:t>
-            </a:r>
-            <a:r>
-              <a:rPr lang="en-US" sz="1500" dirty="0"/>
-              <a:t>: Securely stores sensitive data, such as passwords or API keys. Data is stored in base64-encoded format. Can be used in a similar manner as ConfigMaps, but with encryption.</a:t>
-            </a:r>
-          </a:p>
-          <a:p>
-            <a:r>
-              <a:rPr lang="en-US" sz="1500" b="1" dirty="0"/>
-              <a:t>Namespace</a:t>
-            </a:r>
-            <a:r>
-              <a:rPr lang="en-US" sz="1500" dirty="0"/>
-              <a:t>: Virtual clusters within a physical Kubernetes cluster. Provides a way to partition resources, isolate workloads, and manage access control. Used to avoid naming collisions and separate different environments or teams.</a:t>
-            </a:r>
-          </a:p>
-          <a:p>
-            <a:endParaRPr lang="en-US" sz="1500" dirty="0"/>
-          </a:p>
-          <a:p>
-            <a:pPr marL="0" indent="0">
-              <a:buNone/>
-            </a:pPr>
-            <a:r>
-              <a:rPr lang="en-US" sz="1500" dirty="0"/>
-              <a:t>Kubernetes Commands Quick Reference: </a:t>
-            </a:r>
-            <a:r>
-              <a:rPr lang="en-US" sz="1500" dirty="0">
-                <a:hlinkClick r:id="rId2"/>
-              </a:rPr>
-              <a:t>https://kubernetes.io/docs/reference/kubectl/quick-reference/</a:t>
-            </a:r>
-            <a:endParaRPr lang="en-US" sz="1500" dirty="0"/>
-          </a:p>
-        </p:txBody>
-      </p:sp>
-    </p:spTree>
-    <p:extLst>
-      <p:ext uri="{BB962C8B-B14F-4D97-AF65-F5344CB8AC3E}">
-        <p14:creationId xmlns:p14="http://schemas.microsoft.com/office/powerpoint/2010/main" val="4079115154"/>
-      </p:ext>
-    </p:extLst>
-  </p:cSld>
-  <p:clrMapOvr>
-    <a:masterClrMapping/>
-  </p:clrMapOvr>
-</p:sld>
-</file>
-
-<file path=ppt/slides/slide11.xml><?xml version="1.0" encoding="utf-8"?>
-<p:sld xmlns:a="http://schemas.openxmlformats.org/drawingml/2006/main" xmlns:r="http://schemas.openxmlformats.org/officeDocument/2006/relationships" xmlns:p="http://schemas.openxmlformats.org/presentationml/2006/main">
-  <p:cSld>
-    <p:bg>
-      <p:bgPr>
-        <a:solidFill>
-          <a:schemeClr val="bg1"/>
-        </a:solidFill>
-        <a:effectLst/>
-      </p:bgPr>
-    </p:bg>
-    <p:spTree>
-      <p:nvGrpSpPr>
-        <p:cNvPr id="1" name=""/>
-        <p:cNvGrpSpPr/>
-        <p:nvPr/>
-      </p:nvGrpSpPr>
-      <p:grpSpPr>
-        <a:xfrm>
-          <a:off x="0" y="0"/>
-          <a:ext cx="0" cy="0"/>
-          <a:chOff x="0" y="0"/>
-          <a:chExt cx="0" cy="0"/>
-        </a:xfrm>
-      </p:grpSpPr>
-      <p:sp useBgFill="1">
-        <p:nvSpPr>
           <p:cNvPr id="47" name="Rectangle 46">
             <a:extLst>
               <a:ext uri="{FF2B5EF4-FFF2-40B4-BE49-F238E27FC236}">
@@ -11156,7 +10484,7 @@
 </p:sld>
 </file>
 
-<file path=ppt/slides/slide12.xml><?xml version="1.0" encoding="utf-8"?>
+<file path=ppt/slides/slide11.xml><?xml version="1.0" encoding="utf-8"?>
 <p:sld xmlns:a="http://schemas.openxmlformats.org/drawingml/2006/main" xmlns:r="http://schemas.openxmlformats.org/officeDocument/2006/relationships" xmlns:p="http://schemas.openxmlformats.org/presentationml/2006/main">
   <p:cSld>
     <p:bg>
@@ -16479,22 +15807,22 @@
           <a:lstStyle/>
           <a:p>
             <a:r>
-              <a:rPr lang="en-IN" sz="4000" dirty="0">
+              <a:rPr lang="en-US" sz="4000" dirty="0">
                 <a:solidFill>
                   <a:srgbClr val="FFFFFF"/>
                 </a:solidFill>
               </a:rPr>
-              <a:t>Kubernetes Cluster Architecture</a:t>
+              <a:t>Kubernetes Objects</a:t>
             </a:r>
           </a:p>
         </p:txBody>
       </p:sp>
       <p:sp>
         <p:nvSpPr>
-          <p:cNvPr id="3" name="Content Placeholder 2">
+          <p:cNvPr id="4" name="Content Placeholder 3">
             <a:extLst>
               <a:ext uri="{FF2B5EF4-FFF2-40B4-BE49-F238E27FC236}">
-                <a16:creationId xmlns:a16="http://schemas.microsoft.com/office/drawing/2014/main" id="{A6915FD1-2B3A-46A6-3A84-0F16F8FE8CB4}"/>
+                <a16:creationId xmlns:a16="http://schemas.microsoft.com/office/drawing/2014/main" id="{BAECFD7C-983F-AF14-825A-F9A9A2355071}"/>
               </a:ext>
             </a:extLst>
           </p:cNvPr>
@@ -16505,23 +15833,128 @@
             <p:ph idx="1"/>
           </p:nvPr>
         </p:nvSpPr>
-        <p:spPr/>
+        <p:spPr>
+          <a:xfrm>
+            <a:off x="459350" y="1825624"/>
+            <a:ext cx="11224650" cy="4625975"/>
+          </a:xfrm>
+        </p:spPr>
         <p:txBody>
-          <a:bodyPr/>
+          <a:bodyPr>
+            <a:normAutofit/>
+          </a:bodyPr>
           <a:lstStyle/>
           <a:p>
             <a:r>
-              <a:rPr lang="en-US" dirty="0"/>
-              <a:t>Refer to draw.io</a:t>
+              <a:rPr lang="en-US" sz="1500" b="1" dirty="0"/>
+              <a:t>Pod</a:t>
             </a:r>
-            <a:endParaRPr lang="en-IN" dirty="0"/>
+            <a:r>
+              <a:rPr lang="en-US" sz="1500" dirty="0"/>
+              <a:t>: The smallest and most basic unit in Kubernetes. It represents a single instance of a running process or workload. It can consist of one or more containers tightly coupled and sharing resources.</a:t>
+            </a:r>
+          </a:p>
+          <a:p>
+            <a:r>
+              <a:rPr lang="en-US" sz="1500" b="1" dirty="0" err="1"/>
+              <a:t>ReplicaSet</a:t>
+            </a:r>
+            <a:r>
+              <a:rPr lang="en-US" sz="1500" dirty="0"/>
+              <a:t>: Ensures a specified number of pod replicas are always running. Part of the scaling and self-healing mechanism in Kubernetes. Can be used directly, but Deployments are recommended for higher-level management.</a:t>
+            </a:r>
+          </a:p>
+          <a:p>
+            <a:r>
+              <a:rPr lang="en-US" sz="1500" b="1" dirty="0"/>
+              <a:t>Deployment</a:t>
+            </a:r>
+            <a:r>
+              <a:rPr lang="en-US" sz="1500" dirty="0"/>
+              <a:t>: Declarative approach to manage and update application deployments. It defines desired state, including the number of replicas and container images. Handles rolling updates and rollbacks to ensure high availability.</a:t>
+            </a:r>
+          </a:p>
+          <a:p>
+            <a:r>
+              <a:rPr lang="en-US" sz="1500" b="1" dirty="0"/>
+              <a:t>Service</a:t>
+            </a:r>
+            <a:r>
+              <a:rPr lang="en-US" sz="1500" dirty="0"/>
+              <a:t>: Enables networking and service discovery within the cluster. Provides a stable endpoint and load balancing for accessing a set of pods. Supports different types, including </a:t>
+            </a:r>
+            <a:r>
+              <a:rPr lang="en-US" sz="1500" dirty="0" err="1"/>
+              <a:t>ClusterIP</a:t>
+            </a:r>
+            <a:r>
+              <a:rPr lang="en-US" sz="1500" dirty="0"/>
+              <a:t>, </a:t>
+            </a:r>
+            <a:r>
+              <a:rPr lang="en-US" sz="1500" dirty="0" err="1"/>
+              <a:t>NodePort</a:t>
+            </a:r>
+            <a:r>
+              <a:rPr lang="en-US" sz="1500" dirty="0"/>
+              <a:t>, and LoadBalancer.</a:t>
+            </a:r>
+          </a:p>
+          <a:p>
+            <a:r>
+              <a:rPr lang="en-US" sz="1500" b="1" dirty="0" err="1"/>
+              <a:t>ConfigMap</a:t>
+            </a:r>
+            <a:r>
+              <a:rPr lang="en-US" sz="1500" dirty="0"/>
+              <a:t>: Stores configuration data as key-value pairs or files. Allows decoupling of configuration from the container images. Can be mounted as a volume or passed as environment variables to pods.</a:t>
+            </a:r>
+          </a:p>
+          <a:p>
+            <a:r>
+              <a:rPr lang="en-US" sz="1500" b="1" dirty="0"/>
+              <a:t>Secret</a:t>
+            </a:r>
+            <a:r>
+              <a:rPr lang="en-US" sz="1500" dirty="0"/>
+              <a:t>: Securely stores sensitive data, such as passwords or API keys. Data is stored in base64-encoded format. Can be used in a similar manner as ConfigMaps, but with encryption.</a:t>
+            </a:r>
+          </a:p>
+          <a:p>
+            <a:r>
+              <a:rPr lang="en-US" sz="1500" b="1" dirty="0"/>
+              <a:t>Namespace</a:t>
+            </a:r>
+            <a:r>
+              <a:rPr lang="en-US" sz="1500" dirty="0"/>
+              <a:t>: Virtual clusters within a physical Kubernetes cluster. Provides a way to partition resources, isolate workloads, and manage access control. Used to avoid naming collisions and separate different environments or teams.</a:t>
+            </a:r>
+          </a:p>
+          <a:p>
+            <a:endParaRPr lang="en-US" sz="1500" dirty="0"/>
+          </a:p>
+          <a:p>
+            <a:pPr marL="0" indent="0">
+              <a:buNone/>
+            </a:pPr>
+            <a:r>
+              <a:rPr lang="en-US" sz="1500" dirty="0"/>
+              <a:t>Kubernetes Commands Quick Reference: </a:t>
+            </a:r>
+            <a:r>
+              <a:rPr lang="en-US" sz="1500" dirty="0">
+                <a:hlinkClick r:id="rId2"/>
+              </a:rPr>
+              <a:t>https://kubernetes.io/docs/reference/kubectl/quick-reference/</a:t>
+            </a:r>
+            <a:endParaRPr lang="en-US" sz="1500" dirty="0"/>
           </a:p>
         </p:txBody>
       </p:sp>
     </p:spTree>
     <p:extLst>
       <p:ext uri="{BB962C8B-B14F-4D97-AF65-F5344CB8AC3E}">
-        <p14:creationId xmlns:p14="http://schemas.microsoft.com/office/powerpoint/2010/main" val="930514825"/>
+        <p14:creationId xmlns:p14="http://schemas.microsoft.com/office/powerpoint/2010/main" val="4079115154"/>
       </p:ext>
     </p:extLst>
   </p:cSld>

</xml_diff>